<commit_message>
Added PDF presentation and images
</commit_message>
<xml_diff>
--- a/Presentation.pptx
+++ b/Presentation.pptx
@@ -16,12 +16,12 @@
     <p:sldId id="278" r:id="rId7"/>
     <p:sldId id="291" r:id="rId8"/>
     <p:sldId id="292" r:id="rId9"/>
-    <p:sldId id="258" r:id="rId10"/>
-    <p:sldId id="287" r:id="rId11"/>
-    <p:sldId id="290" r:id="rId12"/>
-    <p:sldId id="289" r:id="rId13"/>
-    <p:sldId id="293" r:id="rId14"/>
-    <p:sldId id="282" r:id="rId15"/>
+    <p:sldId id="294" r:id="rId10"/>
+    <p:sldId id="258" r:id="rId11"/>
+    <p:sldId id="287" r:id="rId12"/>
+    <p:sldId id="290" r:id="rId13"/>
+    <p:sldId id="289" r:id="rId14"/>
+    <p:sldId id="293" r:id="rId15"/>
     <p:sldId id="271" r:id="rId16"/>
   </p:sldIdLst>
   <p:sldSz cx="12192000" cy="6858000"/>
@@ -1100,7 +1100,7 @@
           <a:p>
             <a:r>
               <a:rPr lang="en-US" dirty="0"/>
-              <a:t>The cruise and maneuvering stages were associated with most accidents. </a:t>
+              <a:t>The take off and landing stages were associated with high numbers of accidents. Null had the most accidents and points to poor data entry or inconclusive information to make a determination on the stage of flight. </a:t>
             </a:r>
           </a:p>
         </p:txBody>
@@ -1122,7 +1122,7 @@
           <a:p>
             <a:fld id="{22289C57-55D7-40A4-A101-E74FAC7A092B}" type="slidenum">
               <a:rPr lang="en-US" smtClean="0"/>
-              <a:t>6</a:t>
+              <a:t>7</a:t>
             </a:fld>
             <a:endParaRPr lang="en-US" dirty="0"/>
           </a:p>
@@ -1209,7 +1209,7 @@
           <a:p>
             <a:fld id="{22289C57-55D7-40A4-A101-E74FAC7A092B}" type="slidenum">
               <a:rPr lang="en-US" smtClean="0"/>
-              <a:t>7</a:t>
+              <a:t>8</a:t>
             </a:fld>
             <a:endParaRPr lang="en-US" dirty="0"/>
           </a:p>
@@ -1296,7 +1296,7 @@
           <a:p>
             <a:fld id="{22289C57-55D7-40A4-A101-E74FAC7A092B}" type="slidenum">
               <a:rPr lang="en-US" smtClean="0"/>
-              <a:t>8</a:t>
+              <a:t>9</a:t>
             </a:fld>
             <a:endParaRPr lang="en-US" dirty="0"/>
           </a:p>
@@ -1316,90 +1316,6 @@
 </file>
 
 <file path=ppt/notesSlides/notesSlide8.xml><?xml version="1.0" encoding="utf-8"?>
-<p:notes xmlns:a="http://schemas.openxmlformats.org/drawingml/2006/main" xmlns:r="http://schemas.openxmlformats.org/officeDocument/2006/relationships" xmlns:p="http://schemas.openxmlformats.org/presentationml/2006/main">
-  <p:cSld>
-    <p:spTree>
-      <p:nvGrpSpPr>
-        <p:cNvPr id="1" name=""/>
-        <p:cNvGrpSpPr/>
-        <p:nvPr/>
-      </p:nvGrpSpPr>
-      <p:grpSpPr>
-        <a:xfrm>
-          <a:off x="0" y="0"/>
-          <a:ext cx="0" cy="0"/>
-          <a:chOff x="0" y="0"/>
-          <a:chExt cx="0" cy="0"/>
-        </a:xfrm>
-      </p:grpSpPr>
-      <p:sp>
-        <p:nvSpPr>
-          <p:cNvPr id="2" name="Slide Image Placeholder 1"/>
-          <p:cNvSpPr>
-            <a:spLocks noGrp="1" noRot="1" noChangeAspect="1"/>
-          </p:cNvSpPr>
-          <p:nvPr>
-            <p:ph type="sldImg"/>
-          </p:nvPr>
-        </p:nvSpPr>
-        <p:spPr/>
-      </p:sp>
-      <p:sp>
-        <p:nvSpPr>
-          <p:cNvPr id="3" name="Notes Placeholder 2"/>
-          <p:cNvSpPr>
-            <a:spLocks noGrp="1"/>
-          </p:cNvSpPr>
-          <p:nvPr>
-            <p:ph type="body" idx="1"/>
-          </p:nvPr>
-        </p:nvSpPr>
-        <p:spPr/>
-        <p:txBody>
-          <a:bodyPr/>
-          <a:lstStyle/>
-          <a:p>
-            <a:endParaRPr lang="en-US" dirty="0"/>
-          </a:p>
-        </p:txBody>
-      </p:sp>
-      <p:sp>
-        <p:nvSpPr>
-          <p:cNvPr id="4" name="Slide Number Placeholder 3"/>
-          <p:cNvSpPr>
-            <a:spLocks noGrp="1"/>
-          </p:cNvSpPr>
-          <p:nvPr>
-            <p:ph type="sldNum" sz="quarter" idx="5"/>
-          </p:nvPr>
-        </p:nvSpPr>
-        <p:spPr/>
-        <p:txBody>
-          <a:bodyPr/>
-          <a:lstStyle/>
-          <a:p>
-            <a:fld id="{22289C57-55D7-40A4-A101-E74FAC7A092B}" type="slidenum">
-              <a:rPr lang="en-US" smtClean="0"/>
-              <a:t>11</a:t>
-            </a:fld>
-            <a:endParaRPr lang="en-US" dirty="0"/>
-          </a:p>
-        </p:txBody>
-      </p:sp>
-    </p:spTree>
-    <p:extLst>
-      <p:ext uri="{BB962C8B-B14F-4D97-AF65-F5344CB8AC3E}">
-        <p14:creationId xmlns:p14="http://schemas.microsoft.com/office/powerpoint/2010/main" val="236659336"/>
-      </p:ext>
-    </p:extLst>
-  </p:cSld>
-  <p:clrMapOvr>
-    <a:masterClrMapping/>
-  </p:clrMapOvr>
-</p:notes>
-</file>
-
-<file path=ppt/notesSlides/notesSlide9.xml><?xml version="1.0" encoding="utf-8"?>
 <p:notes xmlns:a="http://schemas.openxmlformats.org/drawingml/2006/main" xmlns:r="http://schemas.openxmlformats.org/officeDocument/2006/relationships" xmlns:p="http://schemas.openxmlformats.org/presentationml/2006/main">
   <p:cSld>
     <p:spTree>
@@ -6912,7 +6828,7 @@
           <p:cNvPr id="2" name="Title 1">
             <a:extLst>
               <a:ext uri="{FF2B5EF4-FFF2-40B4-BE49-F238E27FC236}">
-                <a16:creationId xmlns:a16="http://schemas.microsoft.com/office/drawing/2014/main" id="{E7B23754-E454-B60D-EDAE-790CB98A7ACC}"/>
+                <a16:creationId xmlns:a16="http://schemas.microsoft.com/office/drawing/2014/main" id="{E07F0014-1136-E920-6A7B-3F4CDAE4D46A}"/>
               </a:ext>
             </a:extLst>
           </p:cNvPr>
@@ -6930,7 +6846,7 @@
           <a:p>
             <a:r>
               <a:rPr lang="en-US" dirty="0"/>
-              <a:t>Next steps</a:t>
+              <a:t>Recommendations</a:t>
             </a:r>
           </a:p>
         </p:txBody>
@@ -6940,7 +6856,7 @@
           <p:cNvPr id="3" name="Content Placeholder 2">
             <a:extLst>
               <a:ext uri="{FF2B5EF4-FFF2-40B4-BE49-F238E27FC236}">
-                <a16:creationId xmlns:a16="http://schemas.microsoft.com/office/drawing/2014/main" id="{005C8202-F409-ABD0-F2BB-C6DD41AC3314}"/>
+                <a16:creationId xmlns:a16="http://schemas.microsoft.com/office/drawing/2014/main" id="{186AC1EA-D610-EC6A-0913-43B87735A80D}"/>
               </a:ext>
             </a:extLst>
           </p:cNvPr>
@@ -6956,21 +6872,50 @@
           <a:bodyPr/>
           <a:lstStyle/>
           <a:p>
-            <a:pPr marL="285750" indent="-285750">
-              <a:buFont typeface="Arial" panose="020B0604020202020204" pitchFamily="34" charset="0"/>
-              <a:buChar char="•"/>
+            <a:r>
+              <a:rPr lang="en-US" dirty="0"/>
+              <a:t>The following are recommendations based on the data analysis done</a:t>
+            </a:r>
+          </a:p>
+          <a:p>
+            <a:pPr marL="342900" indent="-342900">
+              <a:buAutoNum type="arabicPeriod"/>
             </a:pPr>
             <a:r>
               <a:rPr lang="en-US" dirty="0"/>
-              <a:t>Next steps could include </a:t>
-            </a:r>
-          </a:p>
-          <a:p>
-            <a:pPr marL="569214" lvl="1"/>
-            <a:r>
-              <a:rPr lang="en-US" dirty="0"/>
-              <a:t>Conducting a feasibility study of best airports to set up the  business</a:t>
-            </a:r>
+              <a:t>Invest in reinforcing pilot training especially drills for take off, maneuvering and landing, where accidents tend to occur.</a:t>
+            </a:r>
+          </a:p>
+          <a:p>
+            <a:pPr marL="342900" indent="-342900">
+              <a:buAutoNum type="arabicPeriod"/>
+            </a:pPr>
+            <a:r>
+              <a:rPr lang="en-US" dirty="0"/>
+              <a:t>Purchase larger aircrafts with more engines as they are safer compared to single engines </a:t>
+            </a:r>
+          </a:p>
+          <a:p>
+            <a:pPr marL="342900" indent="-342900">
+              <a:buAutoNum type="arabicPeriod"/>
+            </a:pPr>
+            <a:r>
+              <a:rPr lang="en-US" dirty="0"/>
+              <a:t>Invest in installing the most UpToDate meteorological instruments to reinforces the use of IMC for navigation </a:t>
+            </a:r>
+            <a:br>
+              <a:rPr lang="en-US" dirty="0"/>
+            </a:br>
+            <a:br>
+              <a:rPr lang="en-US" dirty="0"/>
+            </a:br>
+            <a:endParaRPr lang="en-US" dirty="0"/>
+          </a:p>
+          <a:p>
+            <a:pPr marL="342900" indent="-342900">
+              <a:buAutoNum type="arabicPeriod"/>
+            </a:pPr>
+            <a:endParaRPr lang="en-US" dirty="0"/>
           </a:p>
         </p:txBody>
       </p:sp>
@@ -6979,7 +6924,7 @@
           <p:cNvPr id="4" name="Slide Number Placeholder 3">
             <a:extLst>
               <a:ext uri="{FF2B5EF4-FFF2-40B4-BE49-F238E27FC236}">
-                <a16:creationId xmlns:a16="http://schemas.microsoft.com/office/drawing/2014/main" id="{14BDF928-FDB9-5A2B-5F9D-A046866AAB24}"/>
+                <a16:creationId xmlns:a16="http://schemas.microsoft.com/office/drawing/2014/main" id="{72ED72AC-20E3-C28D-4DC6-B276147D63BD}"/>
               </a:ext>
             </a:extLst>
           </p:cNvPr>
@@ -7007,7 +6952,7 @@
     </p:spTree>
     <p:extLst>
       <p:ext uri="{BB962C8B-B14F-4D97-AF65-F5344CB8AC3E}">
-        <p14:creationId xmlns:p14="http://schemas.microsoft.com/office/powerpoint/2010/main" val="3595344061"/>
+        <p14:creationId xmlns:p14="http://schemas.microsoft.com/office/powerpoint/2010/main" val="1704641078"/>
       </p:ext>
     </p:extLst>
   </p:cSld>
@@ -7039,7 +6984,7 @@
           <p:cNvPr id="2" name="Title 1">
             <a:extLst>
               <a:ext uri="{FF2B5EF4-FFF2-40B4-BE49-F238E27FC236}">
-                <a16:creationId xmlns:a16="http://schemas.microsoft.com/office/drawing/2014/main" id="{8B27D9B3-B64F-656A-0D99-161A6C0F518F}"/>
+                <a16:creationId xmlns:a16="http://schemas.microsoft.com/office/drawing/2014/main" id="{E7B23754-E454-B60D-EDAE-790CB98A7ACC}"/>
               </a:ext>
             </a:extLst>
           </p:cNvPr>
@@ -7050,224 +6995,74 @@
             <p:ph type="title"/>
           </p:nvPr>
         </p:nvSpPr>
-        <p:spPr>
-          <a:xfrm>
-            <a:off x="1341120" y="558801"/>
-            <a:ext cx="9953308" cy="1780860"/>
-          </a:xfrm>
-        </p:spPr>
+        <p:spPr/>
         <p:txBody>
           <a:bodyPr/>
           <a:lstStyle/>
           <a:p>
             <a:r>
               <a:rPr lang="en-US" dirty="0"/>
-              <a:t>Navigating Q&amp;A Sessions</a:t>
-            </a:r>
-          </a:p>
-        </p:txBody>
-      </p:sp>
-      <p:sp>
-        <p:nvSpPr>
-          <p:cNvPr id="13" name="Text Placeholder 12">
-            <a:extLst>
-              <a:ext uri="{FF2B5EF4-FFF2-40B4-BE49-F238E27FC236}">
-                <a16:creationId xmlns:a16="http://schemas.microsoft.com/office/drawing/2014/main" id="{7E5B6E40-3A7D-ACF7-AA38-25977D322D81}"/>
-              </a:ext>
-            </a:extLst>
-          </p:cNvPr>
-          <p:cNvSpPr>
-            <a:spLocks noGrp="1"/>
-          </p:cNvSpPr>
-          <p:nvPr>
-            <p:ph type="body" idx="1"/>
-          </p:nvPr>
-        </p:nvSpPr>
-        <p:spPr>
-          <a:xfrm>
-            <a:off x="1341120" y="2960877"/>
-            <a:ext cx="2722880" cy="351284"/>
-          </a:xfrm>
-        </p:spPr>
+              <a:t>Next steps</a:t>
+            </a:r>
+          </a:p>
+        </p:txBody>
+      </p:sp>
+      <p:sp>
+        <p:nvSpPr>
+          <p:cNvPr id="3" name="Content Placeholder 2">
+            <a:extLst>
+              <a:ext uri="{FF2B5EF4-FFF2-40B4-BE49-F238E27FC236}">
+                <a16:creationId xmlns:a16="http://schemas.microsoft.com/office/drawing/2014/main" id="{005C8202-F409-ABD0-F2BB-C6DD41AC3314}"/>
+              </a:ext>
+            </a:extLst>
+          </p:cNvPr>
+          <p:cNvSpPr>
+            <a:spLocks noGrp="1"/>
+          </p:cNvSpPr>
+          <p:nvPr>
+            <p:ph sz="half" idx="2"/>
+          </p:nvPr>
+        </p:nvSpPr>
+        <p:spPr/>
         <p:txBody>
           <a:bodyPr/>
           <a:lstStyle/>
           <a:p>
-            <a:r>
-              <a:rPr lang="en-US" dirty="0"/>
-              <a:t>Preparing for questions</a:t>
-            </a:r>
-          </a:p>
-        </p:txBody>
-      </p:sp>
-      <p:sp>
-        <p:nvSpPr>
-          <p:cNvPr id="36" name="Content Placeholder 35">
-            <a:extLst>
-              <a:ext uri="{FF2B5EF4-FFF2-40B4-BE49-F238E27FC236}">
-                <a16:creationId xmlns:a16="http://schemas.microsoft.com/office/drawing/2014/main" id="{E71298F0-74F1-FECA-0F02-495F9A2EBA7B}"/>
-              </a:ext>
-            </a:extLst>
-          </p:cNvPr>
-          <p:cNvSpPr>
-            <a:spLocks noGrp="1"/>
-          </p:cNvSpPr>
-          <p:nvPr>
-            <p:ph sz="half" idx="15"/>
-          </p:nvPr>
-        </p:nvSpPr>
-        <p:spPr>
-          <a:xfrm>
-            <a:off x="1341120" y="3392035"/>
-            <a:ext cx="2722880" cy="2907164"/>
-          </a:xfrm>
-        </p:spPr>
-        <p:txBody>
-          <a:bodyPr>
-            <a:normAutofit/>
-          </a:bodyPr>
-          <a:lstStyle/>
-          <a:p>
-            <a:r>
-              <a:rPr lang="en-US" dirty="0"/>
-              <a:t>Know your material in advance</a:t>
-            </a:r>
-          </a:p>
-          <a:p>
-            <a:r>
-              <a:rPr lang="en-US" dirty="0"/>
-              <a:t>Anticipate common questions</a:t>
-            </a:r>
-          </a:p>
-          <a:p>
-            <a:r>
-              <a:rPr lang="en-US" dirty="0"/>
-              <a:t>Rehearse your responses</a:t>
-            </a:r>
-          </a:p>
-        </p:txBody>
-      </p:sp>
-      <p:sp>
-        <p:nvSpPr>
-          <p:cNvPr id="15" name="Text Placeholder 14">
-            <a:extLst>
-              <a:ext uri="{FF2B5EF4-FFF2-40B4-BE49-F238E27FC236}">
-                <a16:creationId xmlns:a16="http://schemas.microsoft.com/office/drawing/2014/main" id="{A536BD54-EFA1-25A2-9F04-4F22C36E2A5D}"/>
-              </a:ext>
-            </a:extLst>
-          </p:cNvPr>
-          <p:cNvSpPr>
-            <a:spLocks noGrp="1"/>
-          </p:cNvSpPr>
-          <p:nvPr>
-            <p:ph type="body" idx="10"/>
-          </p:nvPr>
-        </p:nvSpPr>
-        <p:spPr>
-          <a:xfrm>
-            <a:off x="4754881" y="2960877"/>
-            <a:ext cx="5516880" cy="351284"/>
-          </a:xfrm>
-        </p:spPr>
-        <p:txBody>
-          <a:bodyPr/>
-          <a:lstStyle/>
-          <a:p>
-            <a:r>
-              <a:rPr lang="en-US" dirty="0"/>
-              <a:t>Maintaining composure</a:t>
-            </a:r>
-          </a:p>
-          <a:p>
-            <a:endParaRPr lang="en-US" dirty="0"/>
-          </a:p>
-        </p:txBody>
-      </p:sp>
-      <p:sp>
-        <p:nvSpPr>
-          <p:cNvPr id="14" name="Content Placeholder 13">
-            <a:extLst>
-              <a:ext uri="{FF2B5EF4-FFF2-40B4-BE49-F238E27FC236}">
-                <a16:creationId xmlns:a16="http://schemas.microsoft.com/office/drawing/2014/main" id="{5112969F-EB84-49D5-7100-1FB28870FB30}"/>
-              </a:ext>
-            </a:extLst>
-          </p:cNvPr>
-          <p:cNvSpPr>
-            <a:spLocks noGrp="1"/>
-          </p:cNvSpPr>
-          <p:nvPr>
-            <p:ph sz="half" idx="14"/>
-          </p:nvPr>
-        </p:nvSpPr>
-        <p:spPr>
-          <a:xfrm>
-            <a:off x="4754881" y="3324859"/>
-            <a:ext cx="5506720" cy="3031489"/>
-          </a:xfrm>
-        </p:spPr>
-        <p:txBody>
-          <a:bodyPr>
-            <a:normAutofit/>
-          </a:bodyPr>
-          <a:lstStyle/>
-          <a:p>
-            <a:r>
-              <a:rPr lang="en-US" dirty="0"/>
-              <a:t>Maintaining composure during the Q&amp;A session is essential for projecting confidence and authority. Consider the following tips for staying composed:</a:t>
-            </a:r>
-          </a:p>
-          <a:p>
-            <a:pPr lvl="1"/>
-            <a:r>
-              <a:rPr lang="en-US" dirty="0"/>
-              <a:t>Stay calm</a:t>
-            </a:r>
-          </a:p>
-          <a:p>
-            <a:pPr lvl="1"/>
-            <a:r>
-              <a:rPr lang="en-US" dirty="0"/>
-              <a:t>Actively listen</a:t>
-            </a:r>
-          </a:p>
-          <a:p>
-            <a:pPr lvl="1"/>
-            <a:r>
-              <a:rPr lang="en-US" dirty="0"/>
-              <a:t>Pause and reflect</a:t>
-            </a:r>
-          </a:p>
-          <a:p>
-            <a:pPr lvl="1"/>
-            <a:r>
-              <a:rPr lang="en-US" dirty="0"/>
-              <a:t>Maintain eye contact</a:t>
-            </a:r>
-          </a:p>
-        </p:txBody>
-      </p:sp>
-      <p:sp>
-        <p:nvSpPr>
-          <p:cNvPr id="68" name="Slide Number Placeholder 67">
-            <a:extLst>
-              <a:ext uri="{FF2B5EF4-FFF2-40B4-BE49-F238E27FC236}">
-                <a16:creationId xmlns:a16="http://schemas.microsoft.com/office/drawing/2014/main" id="{AA0ACADD-CC4E-851C-DA07-C22DB97FA23E}"/>
-              </a:ext>
-            </a:extLst>
-          </p:cNvPr>
-          <p:cNvSpPr>
-            <a:spLocks noGrp="1"/>
-          </p:cNvSpPr>
-          <p:nvPr>
-            <p:ph type="sldNum" sz="quarter" idx="13"/>
-          </p:nvPr>
-        </p:nvSpPr>
-        <p:spPr>
-          <a:xfrm>
-            <a:off x="10373350" y="6356349"/>
-            <a:ext cx="987552" cy="365125"/>
-          </a:xfrm>
-        </p:spPr>
+            <a:pPr marL="285750" indent="-285750">
+              <a:buFont typeface="Arial" panose="020B0604020202020204" pitchFamily="34" charset="0"/>
+              <a:buChar char="•"/>
+            </a:pPr>
+            <a:r>
+              <a:rPr lang="en-US" dirty="0"/>
+              <a:t>Next steps could include </a:t>
+            </a:r>
+          </a:p>
+          <a:p>
+            <a:pPr marL="569214" lvl="1"/>
+            <a:r>
+              <a:rPr lang="en-US" dirty="0"/>
+              <a:t>Conducting a feasibility study of best airports to set up the  business</a:t>
+            </a:r>
+          </a:p>
+        </p:txBody>
+      </p:sp>
+      <p:sp>
+        <p:nvSpPr>
+          <p:cNvPr id="4" name="Slide Number Placeholder 3">
+            <a:extLst>
+              <a:ext uri="{FF2B5EF4-FFF2-40B4-BE49-F238E27FC236}">
+                <a16:creationId xmlns:a16="http://schemas.microsoft.com/office/drawing/2014/main" id="{14BDF928-FDB9-5A2B-5F9D-A046866AAB24}"/>
+              </a:ext>
+            </a:extLst>
+          </p:cNvPr>
+          <p:cNvSpPr>
+            <a:spLocks noGrp="1"/>
+          </p:cNvSpPr>
+          <p:nvPr>
+            <p:ph type="sldNum" sz="quarter" idx="12"/>
+          </p:nvPr>
+        </p:nvSpPr>
+        <p:spPr/>
         <p:txBody>
           <a:bodyPr/>
           <a:lstStyle/>
@@ -7284,7 +7079,7 @@
     </p:spTree>
     <p:extLst>
       <p:ext uri="{BB962C8B-B14F-4D97-AF65-F5344CB8AC3E}">
-        <p14:creationId xmlns:p14="http://schemas.microsoft.com/office/powerpoint/2010/main" val="636929804"/>
+        <p14:creationId xmlns:p14="http://schemas.microsoft.com/office/powerpoint/2010/main" val="3595344061"/>
       </p:ext>
     </p:extLst>
   </p:cSld>
@@ -7373,8 +7168,8 @@
           <a:lstStyle/>
           <a:p>
             <a:r>
-              <a:rPr lang="en-US" dirty="0"/>
-              <a:t>Any questions?</a:t>
+              <a:rPr lang="en-US"/>
+              <a:t>Any Questions? </a:t>
             </a:r>
           </a:p>
           <a:p>
@@ -7661,7 +7456,7 @@
             </a:pPr>
             <a:r>
               <a:rPr lang="en-US" dirty="0"/>
-              <a:t>Does the number of engines correlate with accident and severity of accidents?</a:t>
+              <a:t>Which aircraft is associated with the most accidents </a:t>
             </a:r>
           </a:p>
           <a:p>
@@ -7671,7 +7466,17 @@
             </a:pPr>
             <a:r>
               <a:rPr lang="en-US" dirty="0"/>
-              <a:t>During which phase of flight do most accidents occur?</a:t>
+              <a:t>During which phase of flight do most accidents occur? </a:t>
+            </a:r>
+          </a:p>
+          <a:p>
+            <a:pPr marL="457200" indent="-457200" algn="l">
+              <a:buFont typeface="+mj-lt"/>
+              <a:buAutoNum type="arabicPeriod"/>
+            </a:pPr>
+            <a:r>
+              <a:rPr lang="en-US" dirty="0"/>
+              <a:t>Does the number of engines correlate with accident and severity of accidents?</a:t>
             </a:r>
           </a:p>
           <a:p>
@@ -8108,7 +7913,7 @@
           <p:cNvPr id="2" name="Title 1">
             <a:extLst>
               <a:ext uri="{FF2B5EF4-FFF2-40B4-BE49-F238E27FC236}">
-                <a16:creationId xmlns:a16="http://schemas.microsoft.com/office/drawing/2014/main" id="{0A32731C-311B-46F7-A865-6C3AF6B09A47}"/>
+                <a16:creationId xmlns:a16="http://schemas.microsoft.com/office/drawing/2014/main" id="{0B867BBA-6777-CA1F-F8DA-F122585EB2A8}"/>
               </a:ext>
             </a:extLst>
           </p:cNvPr>
@@ -8117,127 +7922,33 @@
           </p:cNvSpPr>
           <p:nvPr>
             <p:ph type="title"/>
-          </p:nvPr>
-        </p:nvSpPr>
-        <p:spPr/>
-        <p:txBody>
-          <a:bodyPr/>
-          <a:lstStyle/>
-          <a:p>
-            <a:r>
-              <a:rPr lang="en-US" dirty="0"/>
-              <a:t>Phase of flight associated with most accidents </a:t>
-            </a:r>
-          </a:p>
-        </p:txBody>
-      </p:sp>
-      <p:sp>
-        <p:nvSpPr>
-          <p:cNvPr id="6" name="Table Placeholder 5">
-            <a:extLst>
-              <a:ext uri="{FF2B5EF4-FFF2-40B4-BE49-F238E27FC236}">
-                <a16:creationId xmlns:a16="http://schemas.microsoft.com/office/drawing/2014/main" id="{51EDCFE0-8BF4-732D-65C9-83EE75E58E22}"/>
-              </a:ext>
-            </a:extLst>
-          </p:cNvPr>
-          <p:cNvSpPr>
-            <a:spLocks noGrp="1"/>
-          </p:cNvSpPr>
-          <p:nvPr>
-            <p:ph type="tbl" sz="quarter" idx="14"/>
-          </p:nvPr>
-        </p:nvSpPr>
-        <p:spPr/>
-        <p:txBody>
-          <a:bodyPr/>
-          <a:lstStyle/>
-          <a:p>
-            <a:endParaRPr lang="en-US"/>
-          </a:p>
-        </p:txBody>
-      </p:sp>
-      <p:sp>
-        <p:nvSpPr>
-          <p:cNvPr id="14" name="Slide Number Placeholder 5">
-            <a:extLst>
-              <a:ext uri="{FF2B5EF4-FFF2-40B4-BE49-F238E27FC236}">
-                <a16:creationId xmlns:a16="http://schemas.microsoft.com/office/drawing/2014/main" id="{ECE635A2-70B8-3EAB-6A18-952B02EBAA1E}"/>
-              </a:ext>
-            </a:extLst>
-          </p:cNvPr>
-          <p:cNvSpPr>
-            <a:spLocks noGrp="1"/>
-          </p:cNvSpPr>
-          <p:nvPr>
-            <p:ph type="sldNum" sz="quarter" idx="12"/>
-          </p:nvPr>
-        </p:nvSpPr>
-        <p:spPr/>
-        <p:txBody>
-          <a:bodyPr/>
-          <a:lstStyle/>
-          <a:p>
-            <a:fld id="{A49DFD55-3C28-40EF-9E31-A92D2E4017FF}" type="slidenum">
-              <a:rPr lang="en-US" smtClean="0"/>
-              <a:pPr/>
-              <a:t>6</a:t>
-            </a:fld>
-            <a:endParaRPr lang="en-US" dirty="0"/>
-          </a:p>
-        </p:txBody>
-      </p:sp>
-      <p:sp>
-        <p:nvSpPr>
-          <p:cNvPr id="3" name="Text Placeholder 2">
-            <a:extLst>
-              <a:ext uri="{FF2B5EF4-FFF2-40B4-BE49-F238E27FC236}">
-                <a16:creationId xmlns:a16="http://schemas.microsoft.com/office/drawing/2014/main" id="{9D5232F9-FD00-464A-9F17-619C91AEF8F3}"/>
-              </a:ext>
-            </a:extLst>
-          </p:cNvPr>
-          <p:cNvSpPr>
-            <a:spLocks noGrp="1"/>
-          </p:cNvSpPr>
-          <p:nvPr>
-            <p:ph sz="half" idx="4294967295"/>
           </p:nvPr>
         </p:nvSpPr>
         <p:spPr>
           <a:xfrm>
-            <a:off x="0" y="2763838"/>
-            <a:ext cx="7288213" cy="3406775"/>
+            <a:off x="838200" y="337192"/>
+            <a:ext cx="5655197" cy="1997867"/>
           </a:xfrm>
         </p:spPr>
         <p:txBody>
-          <a:bodyPr>
+          <a:bodyPr anchor="b">
             <a:normAutofit/>
           </a:bodyPr>
           <a:lstStyle/>
           <a:p>
-            <a:pPr marL="285750" indent="-285750">
-              <a:buFont typeface="Arial" panose="020B0604020202020204" pitchFamily="34" charset="0"/>
-              <a:buChar char="•"/>
-            </a:pPr>
-            <a:r>
-              <a:rPr lang="en-US" dirty="0"/>
-              <a:t>Data source: National Transport Safety Board</a:t>
-            </a:r>
-          </a:p>
-          <a:p>
-            <a:pPr marL="285750" indent="-285750">
-              <a:buFont typeface="Arial" panose="020B0604020202020204" pitchFamily="34" charset="0"/>
-              <a:buChar char="•"/>
-            </a:pPr>
-            <a:endParaRPr lang="en-US" dirty="0"/>
+            <a:r>
+              <a:rPr lang="en-US" dirty="0"/>
+              <a:t>Aircrafts most involved in accidents</a:t>
+            </a:r>
           </a:p>
         </p:txBody>
       </p:sp>
       <p:pic>
         <p:nvPicPr>
-          <p:cNvPr id="5" name="Picture 4" descr="A screenshot of a computer screen&#10;&#10;AI-generated content may be incorrect.">
-            <a:extLst>
-              <a:ext uri="{FF2B5EF4-FFF2-40B4-BE49-F238E27FC236}">
-                <a16:creationId xmlns:a16="http://schemas.microsoft.com/office/drawing/2014/main" id="{B28EE37F-307A-BA1F-353E-CD80FA2C4804}"/>
+          <p:cNvPr id="6" name="Picture 5">
+            <a:extLst>
+              <a:ext uri="{FF2B5EF4-FFF2-40B4-BE49-F238E27FC236}">
+                <a16:creationId xmlns:a16="http://schemas.microsoft.com/office/drawing/2014/main" id="{F3C86FF8-B2F5-33B4-738F-0844552F8E46}"/>
               </a:ext>
             </a:extLst>
           </p:cNvPr>
@@ -8247,25 +7958,106 @@
           <p:nvPr/>
         </p:nvPicPr>
         <p:blipFill>
-          <a:blip r:embed="rId3"/>
+          <a:blip r:embed="rId2"/>
           <a:stretch>
             <a:fillRect/>
           </a:stretch>
         </p:blipFill>
         <p:spPr>
           <a:xfrm>
-            <a:off x="399255" y="1668379"/>
-            <a:ext cx="11393490" cy="4928125"/>
+            <a:off x="408802" y="2656268"/>
+            <a:ext cx="8589640" cy="3541332"/>
           </a:xfrm>
           <a:prstGeom prst="rect">
             <a:avLst/>
           </a:prstGeom>
         </p:spPr>
       </p:pic>
+      <p:sp>
+        <p:nvSpPr>
+          <p:cNvPr id="15" name="Content Placeholder 5">
+            <a:extLst>
+              <a:ext uri="{FF2B5EF4-FFF2-40B4-BE49-F238E27FC236}">
+                <a16:creationId xmlns:a16="http://schemas.microsoft.com/office/drawing/2014/main" id="{0C26A7D8-8117-8595-1686-1C5457BF22D7}"/>
+              </a:ext>
+            </a:extLst>
+          </p:cNvPr>
+          <p:cNvSpPr>
+            <a:spLocks noGrp="1"/>
+          </p:cNvSpPr>
+          <p:nvPr>
+            <p:ph sz="half" idx="14"/>
+          </p:nvPr>
+        </p:nvSpPr>
+        <p:spPr>
+          <a:xfrm>
+            <a:off x="9176657" y="2656269"/>
+            <a:ext cx="2654077" cy="3541332"/>
+          </a:xfrm>
+        </p:spPr>
+        <p:txBody>
+          <a:bodyPr>
+            <a:normAutofit/>
+          </a:bodyPr>
+          <a:lstStyle/>
+          <a:p>
+            <a:r>
+              <a:rPr lang="en-US" sz="2800" dirty="0"/>
+              <a:t>Cessna Aircrafts were the most accident prone when compared to other makes</a:t>
+            </a:r>
+          </a:p>
+        </p:txBody>
+      </p:sp>
+      <p:sp>
+        <p:nvSpPr>
+          <p:cNvPr id="4" name="Slide Number Placeholder 3">
+            <a:extLst>
+              <a:ext uri="{FF2B5EF4-FFF2-40B4-BE49-F238E27FC236}">
+                <a16:creationId xmlns:a16="http://schemas.microsoft.com/office/drawing/2014/main" id="{89A19CD4-3193-76E8-36B0-6D1E0DE40AA7}"/>
+              </a:ext>
+            </a:extLst>
+          </p:cNvPr>
+          <p:cNvSpPr>
+            <a:spLocks noGrp="1"/>
+          </p:cNvSpPr>
+          <p:nvPr>
+            <p:ph type="sldNum" sz="quarter" idx="12"/>
+          </p:nvPr>
+        </p:nvSpPr>
+        <p:spPr>
+          <a:xfrm>
+            <a:off x="8610600" y="6356350"/>
+            <a:ext cx="2743200" cy="365125"/>
+          </a:xfrm>
+        </p:spPr>
+        <p:txBody>
+          <a:bodyPr anchor="ctr">
+            <a:normAutofit/>
+          </a:bodyPr>
+          <a:lstStyle/>
+          <a:p>
+            <a:pPr>
+              <a:spcAft>
+                <a:spcPts val="600"/>
+              </a:spcAft>
+            </a:pPr>
+            <a:fld id="{A49DFD55-3C28-40EF-9E31-A92D2E4017FF}" type="slidenum">
+              <a:rPr lang="en-US" smtClean="0"/>
+              <a:pPr>
+                <a:spcAft>
+                  <a:spcPts val="600"/>
+                </a:spcAft>
+              </a:pPr>
+              <a:t>6</a:t>
+            </a:fld>
+            <a:endParaRPr lang="en-US"/>
+          </a:p>
+        </p:txBody>
+      </p:sp>
     </p:spTree>
     <p:extLst>
       <p:ext uri="{BB962C8B-B14F-4D97-AF65-F5344CB8AC3E}">
-        <p14:creationId xmlns:p14="http://schemas.microsoft.com/office/powerpoint/2010/main" val="3571516367"/>
+        <p14:creationId xmlns:p14="http://schemas.microsoft.com/office/powerpoint/2010/main" val="2798214566"/>
       </p:ext>
     </p:extLst>
   </p:cSld>
@@ -8297,7 +8089,7 @@
           <p:cNvPr id="2" name="Title 1">
             <a:extLst>
               <a:ext uri="{FF2B5EF4-FFF2-40B4-BE49-F238E27FC236}">
-                <a16:creationId xmlns:a16="http://schemas.microsoft.com/office/drawing/2014/main" id="{D84FF9AE-A7A3-E4F1-E770-C7065D286A72}"/>
+                <a16:creationId xmlns:a16="http://schemas.microsoft.com/office/drawing/2014/main" id="{0A32731C-311B-46F7-A865-6C3AF6B09A47}"/>
               </a:ext>
             </a:extLst>
           </p:cNvPr>
@@ -8315,26 +8107,79 @@
           <a:p>
             <a:r>
               <a:rPr lang="en-US" dirty="0"/>
-              <a:t>Is there a relationship between engine number, aircraft damage and injury severity</a:t>
-            </a:r>
+              <a:t>Phase of flight associated with most accidents </a:t>
+            </a:r>
+          </a:p>
+        </p:txBody>
+      </p:sp>
+      <p:sp>
+        <p:nvSpPr>
+          <p:cNvPr id="6" name="Table Placeholder 5">
+            <a:extLst>
+              <a:ext uri="{FF2B5EF4-FFF2-40B4-BE49-F238E27FC236}">
+                <a16:creationId xmlns:a16="http://schemas.microsoft.com/office/drawing/2014/main" id="{51EDCFE0-8BF4-732D-65C9-83EE75E58E22}"/>
+              </a:ext>
+            </a:extLst>
+          </p:cNvPr>
+          <p:cNvSpPr>
+            <a:spLocks noGrp="1"/>
+          </p:cNvSpPr>
+          <p:nvPr>
+            <p:ph type="tbl" sz="quarter" idx="14"/>
+          </p:nvPr>
+        </p:nvSpPr>
+        <p:spPr/>
+        <p:txBody>
+          <a:bodyPr/>
+          <a:lstStyle/>
+          <a:p>
+            <a:endParaRPr lang="en-US"/>
+          </a:p>
+        </p:txBody>
+      </p:sp>
+      <p:sp>
+        <p:nvSpPr>
+          <p:cNvPr id="14" name="Slide Number Placeholder 5">
+            <a:extLst>
+              <a:ext uri="{FF2B5EF4-FFF2-40B4-BE49-F238E27FC236}">
+                <a16:creationId xmlns:a16="http://schemas.microsoft.com/office/drawing/2014/main" id="{ECE635A2-70B8-3EAB-6A18-952B02EBAA1E}"/>
+              </a:ext>
+            </a:extLst>
+          </p:cNvPr>
+          <p:cNvSpPr>
+            <a:spLocks noGrp="1"/>
+          </p:cNvSpPr>
+          <p:nvPr>
+            <p:ph type="sldNum" sz="quarter" idx="12"/>
+          </p:nvPr>
+        </p:nvSpPr>
+        <p:spPr/>
+        <p:txBody>
+          <a:bodyPr/>
+          <a:lstStyle/>
+          <a:p>
+            <a:fld id="{A49DFD55-3C28-40EF-9E31-A92D2E4017FF}" type="slidenum">
+              <a:rPr lang="en-US" smtClean="0"/>
+              <a:pPr/>
+              <a:t>7</a:t>
+            </a:fld>
+            <a:endParaRPr lang="en-US" dirty="0"/>
           </a:p>
         </p:txBody>
       </p:sp>
       <p:pic>
         <p:nvPicPr>
-          <p:cNvPr id="6" name="Content Placeholder 5" descr="A graph of a number of aircraft damage&#10;&#10;AI-generated content may be incorrect.">
-            <a:extLst>
-              <a:ext uri="{FF2B5EF4-FFF2-40B4-BE49-F238E27FC236}">
-                <a16:creationId xmlns:a16="http://schemas.microsoft.com/office/drawing/2014/main" id="{4FE7DA3B-7022-F47E-2355-C33F252594EE}"/>
+          <p:cNvPr id="10" name="Picture 9" descr="A blue squares with black text&#10;&#10;AI-generated content may be incorrect.">
+            <a:extLst>
+              <a:ext uri="{FF2B5EF4-FFF2-40B4-BE49-F238E27FC236}">
+                <a16:creationId xmlns:a16="http://schemas.microsoft.com/office/drawing/2014/main" id="{3DD7E735-6328-B06E-58AE-FC297C6772F8}"/>
               </a:ext>
             </a:extLst>
           </p:cNvPr>
           <p:cNvPicPr>
-            <a:picLocks noGrp="1" noChangeAspect="1"/>
+            <a:picLocks noChangeAspect="1"/>
           </p:cNvPicPr>
-          <p:nvPr>
-            <p:ph sz="half" idx="2"/>
-          </p:nvPr>
+          <p:nvPr/>
         </p:nvPicPr>
         <p:blipFill>
           <a:blip r:embed="rId3"/>
@@ -8344,41 +8189,131 @@
         </p:blipFill>
         <p:spPr>
           <a:xfrm>
-            <a:off x="1486751" y="2765076"/>
-            <a:ext cx="7288281" cy="3824564"/>
+            <a:off x="399255" y="261495"/>
+            <a:ext cx="11393490" cy="6335009"/>
+          </a:xfrm>
+          <a:prstGeom prst="rect">
+            <a:avLst/>
+          </a:prstGeom>
+        </p:spPr>
+      </p:pic>
+    </p:spTree>
+    <p:extLst>
+      <p:ext uri="{BB962C8B-B14F-4D97-AF65-F5344CB8AC3E}">
+        <p14:creationId xmlns:p14="http://schemas.microsoft.com/office/powerpoint/2010/main" val="3571516367"/>
+      </p:ext>
+    </p:extLst>
+  </p:cSld>
+  <p:clrMapOvr>
+    <a:masterClrMapping/>
+  </p:clrMapOvr>
+</p:sld>
+</file>
+
+<file path=ppt/slides/slide8.xml><?xml version="1.0" encoding="utf-8"?>
+<p:sld xmlns:a="http://schemas.openxmlformats.org/drawingml/2006/main" xmlns:r="http://schemas.openxmlformats.org/officeDocument/2006/relationships" xmlns:p="http://schemas.openxmlformats.org/presentationml/2006/main">
+  <p:cSld>
+    <p:spTree>
+      <p:nvGrpSpPr>
+        <p:cNvPr id="1" name=""/>
+        <p:cNvGrpSpPr/>
+        <p:nvPr/>
+      </p:nvGrpSpPr>
+      <p:grpSpPr>
+        <a:xfrm>
+          <a:off x="0" y="0"/>
+          <a:ext cx="0" cy="0"/>
+          <a:chOff x="0" y="0"/>
+          <a:chExt cx="0" cy="0"/>
+        </a:xfrm>
+      </p:grpSpPr>
+      <p:sp>
+        <p:nvSpPr>
+          <p:cNvPr id="2" name="Title 1">
+            <a:extLst>
+              <a:ext uri="{FF2B5EF4-FFF2-40B4-BE49-F238E27FC236}">
+                <a16:creationId xmlns:a16="http://schemas.microsoft.com/office/drawing/2014/main" id="{D84FF9AE-A7A3-E4F1-E770-C7065D286A72}"/>
+              </a:ext>
+            </a:extLst>
+          </p:cNvPr>
+          <p:cNvSpPr>
+            <a:spLocks noGrp="1"/>
+          </p:cNvSpPr>
+          <p:nvPr>
+            <p:ph type="title"/>
+          </p:nvPr>
+        </p:nvSpPr>
+        <p:spPr/>
+        <p:txBody>
+          <a:bodyPr/>
+          <a:lstStyle/>
+          <a:p>
+            <a:r>
+              <a:rPr lang="en-US" dirty="0"/>
+              <a:t>Is there a relationship between engine number, aircraft damage and injury severity</a:t>
+            </a:r>
+          </a:p>
+        </p:txBody>
+      </p:sp>
+      <p:sp>
+        <p:nvSpPr>
+          <p:cNvPr id="4" name="Slide Number Placeholder 3">
+            <a:extLst>
+              <a:ext uri="{FF2B5EF4-FFF2-40B4-BE49-F238E27FC236}">
+                <a16:creationId xmlns:a16="http://schemas.microsoft.com/office/drawing/2014/main" id="{A91A6333-71F2-003B-24F1-9B808270EFAB}"/>
+              </a:ext>
+            </a:extLst>
+          </p:cNvPr>
+          <p:cNvSpPr>
+            <a:spLocks noGrp="1"/>
+          </p:cNvSpPr>
+          <p:nvPr>
+            <p:ph type="sldNum" sz="quarter" idx="12"/>
+          </p:nvPr>
+        </p:nvSpPr>
+        <p:spPr/>
+        <p:txBody>
+          <a:bodyPr/>
+          <a:lstStyle/>
+          <a:p>
+            <a:fld id="{A49DFD55-3C28-40EF-9E31-A92D2E4017FF}" type="slidenum">
+              <a:rPr lang="en-US" smtClean="0"/>
+              <a:pPr/>
+              <a:t>8</a:t>
+            </a:fld>
+            <a:endParaRPr lang="en-US" dirty="0"/>
+          </a:p>
+        </p:txBody>
+      </p:sp>
+      <p:pic>
+        <p:nvPicPr>
+          <p:cNvPr id="10" name="Content Placeholder 9" descr="A graph with lines and dots&#10;&#10;AI-generated content may be incorrect.">
+            <a:extLst>
+              <a:ext uri="{FF2B5EF4-FFF2-40B4-BE49-F238E27FC236}">
+                <a16:creationId xmlns:a16="http://schemas.microsoft.com/office/drawing/2014/main" id="{FB26672E-FB7E-BC56-C378-01CEB1754C47}"/>
+              </a:ext>
+            </a:extLst>
+          </p:cNvPr>
+          <p:cNvPicPr>
+            <a:picLocks noGrp="1" noChangeAspect="1"/>
+          </p:cNvPicPr>
+          <p:nvPr>
+            <p:ph sz="half" idx="2"/>
+          </p:nvPr>
+        </p:nvPicPr>
+        <p:blipFill>
+          <a:blip r:embed="rId3"/>
+          <a:stretch>
+            <a:fillRect/>
+          </a:stretch>
+        </p:blipFill>
+        <p:spPr>
+          <a:xfrm>
+            <a:off x="1322318" y="2763838"/>
+            <a:ext cx="7288282" cy="3406775"/>
           </a:xfrm>
         </p:spPr>
       </p:pic>
-      <p:sp>
-        <p:nvSpPr>
-          <p:cNvPr id="4" name="Slide Number Placeholder 3">
-            <a:extLst>
-              <a:ext uri="{FF2B5EF4-FFF2-40B4-BE49-F238E27FC236}">
-                <a16:creationId xmlns:a16="http://schemas.microsoft.com/office/drawing/2014/main" id="{A91A6333-71F2-003B-24F1-9B808270EFAB}"/>
-              </a:ext>
-            </a:extLst>
-          </p:cNvPr>
-          <p:cNvSpPr>
-            <a:spLocks noGrp="1"/>
-          </p:cNvSpPr>
-          <p:nvPr>
-            <p:ph type="sldNum" sz="quarter" idx="12"/>
-          </p:nvPr>
-        </p:nvSpPr>
-        <p:spPr/>
-        <p:txBody>
-          <a:bodyPr/>
-          <a:lstStyle/>
-          <a:p>
-            <a:fld id="{A49DFD55-3C28-40EF-9E31-A92D2E4017FF}" type="slidenum">
-              <a:rPr lang="en-US" smtClean="0"/>
-              <a:pPr/>
-              <a:t>7</a:t>
-            </a:fld>
-            <a:endParaRPr lang="en-US" dirty="0"/>
-          </a:p>
-        </p:txBody>
-      </p:sp>
     </p:spTree>
     <p:extLst>
       <p:ext uri="{BB962C8B-B14F-4D97-AF65-F5344CB8AC3E}">
@@ -8392,7 +8327,7 @@
 </p:sld>
 </file>
 
-<file path=ppt/slides/slide8.xml><?xml version="1.0" encoding="utf-8"?>
+<file path=ppt/slides/slide9.xml><?xml version="1.0" encoding="utf-8"?>
 <p:sld xmlns:a="http://schemas.openxmlformats.org/drawingml/2006/main" xmlns:r="http://schemas.openxmlformats.org/officeDocument/2006/relationships" xmlns:p="http://schemas.openxmlformats.org/presentationml/2006/main">
   <p:cSld>
     <p:spTree>
@@ -8467,7 +8402,7 @@
             <a:fld id="{A49DFD55-3C28-40EF-9E31-A92D2E4017FF}" type="slidenum">
               <a:rPr lang="en-US" smtClean="0"/>
               <a:pPr/>
-              <a:t>8</a:t>
+              <a:t>9</a:t>
             </a:fld>
             <a:endParaRPr lang="en-US" dirty="0"/>
           </a:p>
@@ -8506,162 +8441,6 @@
     <p:extLst>
       <p:ext uri="{BB962C8B-B14F-4D97-AF65-F5344CB8AC3E}">
         <p14:creationId xmlns:p14="http://schemas.microsoft.com/office/powerpoint/2010/main" val="2310787922"/>
-      </p:ext>
-    </p:extLst>
-  </p:cSld>
-  <p:clrMapOvr>
-    <a:masterClrMapping/>
-  </p:clrMapOvr>
-</p:sld>
-</file>
-
-<file path=ppt/slides/slide9.xml><?xml version="1.0" encoding="utf-8"?>
-<p:sld xmlns:a="http://schemas.openxmlformats.org/drawingml/2006/main" xmlns:r="http://schemas.openxmlformats.org/officeDocument/2006/relationships" xmlns:p="http://schemas.openxmlformats.org/presentationml/2006/main">
-  <p:cSld>
-    <p:spTree>
-      <p:nvGrpSpPr>
-        <p:cNvPr id="1" name=""/>
-        <p:cNvGrpSpPr/>
-        <p:nvPr/>
-      </p:nvGrpSpPr>
-      <p:grpSpPr>
-        <a:xfrm>
-          <a:off x="0" y="0"/>
-          <a:ext cx="0" cy="0"/>
-          <a:chOff x="0" y="0"/>
-          <a:chExt cx="0" cy="0"/>
-        </a:xfrm>
-      </p:grpSpPr>
-      <p:sp>
-        <p:nvSpPr>
-          <p:cNvPr id="2" name="Title 1">
-            <a:extLst>
-              <a:ext uri="{FF2B5EF4-FFF2-40B4-BE49-F238E27FC236}">
-                <a16:creationId xmlns:a16="http://schemas.microsoft.com/office/drawing/2014/main" id="{E07F0014-1136-E920-6A7B-3F4CDAE4D46A}"/>
-              </a:ext>
-            </a:extLst>
-          </p:cNvPr>
-          <p:cNvSpPr>
-            <a:spLocks noGrp="1"/>
-          </p:cNvSpPr>
-          <p:nvPr>
-            <p:ph type="title"/>
-          </p:nvPr>
-        </p:nvSpPr>
-        <p:spPr/>
-        <p:txBody>
-          <a:bodyPr/>
-          <a:lstStyle/>
-          <a:p>
-            <a:r>
-              <a:rPr lang="en-US" dirty="0"/>
-              <a:t>Recommendations</a:t>
-            </a:r>
-          </a:p>
-        </p:txBody>
-      </p:sp>
-      <p:sp>
-        <p:nvSpPr>
-          <p:cNvPr id="3" name="Content Placeholder 2">
-            <a:extLst>
-              <a:ext uri="{FF2B5EF4-FFF2-40B4-BE49-F238E27FC236}">
-                <a16:creationId xmlns:a16="http://schemas.microsoft.com/office/drawing/2014/main" id="{186AC1EA-D610-EC6A-0913-43B87735A80D}"/>
-              </a:ext>
-            </a:extLst>
-          </p:cNvPr>
-          <p:cNvSpPr>
-            <a:spLocks noGrp="1"/>
-          </p:cNvSpPr>
-          <p:nvPr>
-            <p:ph sz="half" idx="2"/>
-          </p:nvPr>
-        </p:nvSpPr>
-        <p:spPr/>
-        <p:txBody>
-          <a:bodyPr/>
-          <a:lstStyle/>
-          <a:p>
-            <a:r>
-              <a:rPr lang="en-US" dirty="0"/>
-              <a:t>The following are recommendations based on the data analysis done</a:t>
-            </a:r>
-          </a:p>
-          <a:p>
-            <a:pPr marL="342900" indent="-342900">
-              <a:buAutoNum type="arabicPeriod"/>
-            </a:pPr>
-            <a:r>
-              <a:rPr lang="en-US" dirty="0"/>
-              <a:t>Invest in reinforcing pilot training especially drills for take off, maneuvering and landing, where accidents tend to occur.</a:t>
-            </a:r>
-          </a:p>
-          <a:p>
-            <a:pPr marL="342900" indent="-342900">
-              <a:buAutoNum type="arabicPeriod"/>
-            </a:pPr>
-            <a:r>
-              <a:rPr lang="en-US" dirty="0"/>
-              <a:t>Purchase larger aircrafts with more engines as they are safer compared to single engines </a:t>
-            </a:r>
-          </a:p>
-          <a:p>
-            <a:pPr marL="342900" indent="-342900">
-              <a:buAutoNum type="arabicPeriod"/>
-            </a:pPr>
-            <a:r>
-              <a:rPr lang="en-US" dirty="0"/>
-              <a:t>Invest in installing the most UpToDate meteorological instruments to reinforces the use of IMC for navigation </a:t>
-            </a:r>
-            <a:br>
-              <a:rPr lang="en-US" dirty="0"/>
-            </a:br>
-            <a:br>
-              <a:rPr lang="en-US" dirty="0"/>
-            </a:br>
-            <a:endParaRPr lang="en-US" dirty="0"/>
-          </a:p>
-          <a:p>
-            <a:pPr marL="342900" indent="-342900">
-              <a:buAutoNum type="arabicPeriod"/>
-            </a:pPr>
-            <a:endParaRPr lang="en-US" dirty="0"/>
-          </a:p>
-        </p:txBody>
-      </p:sp>
-      <p:sp>
-        <p:nvSpPr>
-          <p:cNvPr id="4" name="Slide Number Placeholder 3">
-            <a:extLst>
-              <a:ext uri="{FF2B5EF4-FFF2-40B4-BE49-F238E27FC236}">
-                <a16:creationId xmlns:a16="http://schemas.microsoft.com/office/drawing/2014/main" id="{72ED72AC-20E3-C28D-4DC6-B276147D63BD}"/>
-              </a:ext>
-            </a:extLst>
-          </p:cNvPr>
-          <p:cNvSpPr>
-            <a:spLocks noGrp="1"/>
-          </p:cNvSpPr>
-          <p:nvPr>
-            <p:ph type="sldNum" sz="quarter" idx="12"/>
-          </p:nvPr>
-        </p:nvSpPr>
-        <p:spPr/>
-        <p:txBody>
-          <a:bodyPr/>
-          <a:lstStyle/>
-          <a:p>
-            <a:fld id="{A49DFD55-3C28-40EF-9E31-A92D2E4017FF}" type="slidenum">
-              <a:rPr lang="en-US" smtClean="0"/>
-              <a:pPr/>
-              <a:t>9</a:t>
-            </a:fld>
-            <a:endParaRPr lang="en-US" dirty="0"/>
-          </a:p>
-        </p:txBody>
-      </p:sp>
-    </p:spTree>
-    <p:extLst>
-      <p:ext uri="{BB962C8B-B14F-4D97-AF65-F5344CB8AC3E}">
-        <p14:creationId xmlns:p14="http://schemas.microsoft.com/office/powerpoint/2010/main" val="1704641078"/>
       </p:ext>
     </p:extLst>
   </p:cSld>

</xml_diff>